<commit_message>
moved common rtl files, modified run_sim.py to take flist as per tb directory name, started stall_for_mem core
</commit_message>
<xml_diff>
--- a/rtl/core/single_cycle/single_cycle.pptx
+++ b/rtl/core/single_cycle/single_cycle.pptx
@@ -111,6 +111,65 @@
     </a:lvl9pPr>
   </p:defaultTextStyle>
 </p:presentation>
+</file>
+
+<file path=ppt/changesInfos/changesInfo1.xml><?xml version="1.0" encoding="utf-8"?>
+<pc:chgInfo xmlns:a="http://schemas.openxmlformats.org/drawingml/2006/main" xmlns:r="http://schemas.openxmlformats.org/officeDocument/2006/relationships" xmlns:ac="http://schemas.microsoft.com/office/drawing/2013/main/command" xmlns:pc="http://schemas.microsoft.com/office/powerpoint/2013/main/command">
+  <pc:docChgLst>
+    <pc:chgData name="Mrinav Saxena" userId="1ae1cb636c956b49" providerId="LiveId" clId="{C7D7DF18-6D46-4D8B-B22C-196329718E9A}"/>
+    <pc:docChg chg="modSld">
+      <pc:chgData name="Mrinav Saxena" userId="1ae1cb636c956b49" providerId="LiveId" clId="{C7D7DF18-6D46-4D8B-B22C-196329718E9A}" dt="2025-09-06T06:26:11.255" v="11" actId="20577"/>
+      <pc:docMkLst>
+        <pc:docMk/>
+      </pc:docMkLst>
+      <pc:sldChg chg="modSp">
+        <pc:chgData name="Mrinav Saxena" userId="1ae1cb636c956b49" providerId="LiveId" clId="{C7D7DF18-6D46-4D8B-B22C-196329718E9A}" dt="2025-09-06T05:56:50.768" v="0" actId="20578"/>
+        <pc:sldMkLst>
+          <pc:docMk/>
+          <pc:sldMk cId="1162196827" sldId="257"/>
+        </pc:sldMkLst>
+        <pc:spChg chg="mod">
+          <ac:chgData name="Mrinav Saxena" userId="1ae1cb636c956b49" providerId="LiveId" clId="{C7D7DF18-6D46-4D8B-B22C-196329718E9A}" dt="2025-09-06T05:56:50.768" v="0" actId="20578"/>
+          <ac:spMkLst>
+            <pc:docMk/>
+            <pc:sldMk cId="1162196827" sldId="257"/>
+            <ac:spMk id="3" creationId="{2A90C5E6-A23B-7EFC-8B04-DDFAB0330FDE}"/>
+          </ac:spMkLst>
+        </pc:spChg>
+      </pc:sldChg>
+      <pc:sldChg chg="modSp mod modNotesTx">
+        <pc:chgData name="Mrinav Saxena" userId="1ae1cb636c956b49" providerId="LiveId" clId="{C7D7DF18-6D46-4D8B-B22C-196329718E9A}" dt="2025-09-06T06:20:58.174" v="9" actId="13822"/>
+        <pc:sldMkLst>
+          <pc:docMk/>
+          <pc:sldMk cId="594340859" sldId="258"/>
+        </pc:sldMkLst>
+        <pc:cxnChg chg="mod">
+          <ac:chgData name="Mrinav Saxena" userId="1ae1cb636c956b49" providerId="LiveId" clId="{C7D7DF18-6D46-4D8B-B22C-196329718E9A}" dt="2025-09-06T06:20:58.174" v="9" actId="13822"/>
+          <ac:cxnSpMkLst>
+            <pc:docMk/>
+            <pc:sldMk cId="594340859" sldId="258"/>
+            <ac:cxnSpMk id="113" creationId="{ABC20937-DE8C-BD33-A16B-C0B7034D2D26}"/>
+          </ac:cxnSpMkLst>
+        </pc:cxnChg>
+      </pc:sldChg>
+      <pc:sldChg chg="modSp mod">
+        <pc:chgData name="Mrinav Saxena" userId="1ae1cb636c956b49" providerId="LiveId" clId="{C7D7DF18-6D46-4D8B-B22C-196329718E9A}" dt="2025-09-06T06:26:11.255" v="11" actId="20577"/>
+        <pc:sldMkLst>
+          <pc:docMk/>
+          <pc:sldMk cId="1176781011" sldId="259"/>
+        </pc:sldMkLst>
+        <pc:spChg chg="mod">
+          <ac:chgData name="Mrinav Saxena" userId="1ae1cb636c956b49" providerId="LiveId" clId="{C7D7DF18-6D46-4D8B-B22C-196329718E9A}" dt="2025-09-06T06:26:11.255" v="11" actId="20577"/>
+          <ac:spMkLst>
+            <pc:docMk/>
+            <pc:sldMk cId="1176781011" sldId="259"/>
+            <ac:spMk id="2" creationId="{BF7DCFF8-B1E0-8C09-C61E-0E40FA15792C}"/>
+          </ac:spMkLst>
+        </pc:spChg>
+      </pc:sldChg>
+    </pc:docChg>
+  </pc:docChgLst>
+</pc:chgInfo>
 </file>
 
 <file path=ppt/notesMasters/notesMaster1.xml><?xml version="1.0" encoding="utf-8"?>
@@ -521,7 +580,7 @@
             </a:r>
             <a:r>
               <a:rPr lang="en-IN" dirty="0"/>
-              <a:t> Line colours just differentiate intersecting signals in the schematic.</a:t>
+              <a:t> Line colours just differentiate between intersecting signals in the schematic.</a:t>
             </a:r>
             <a:endParaRPr lang="en-US" dirty="0"/>
           </a:p>
@@ -18310,19 +18369,19 @@
               <a:gd name="adj1" fmla="val 111652"/>
             </a:avLst>
           </a:prstGeom>
-          <a:ln w="28575">
+          <a:ln>
             <a:tailEnd type="triangle"/>
           </a:ln>
         </p:spPr>
         <p:style>
-          <a:lnRef idx="1">
-            <a:schemeClr val="accent1"/>
+          <a:lnRef idx="3">
+            <a:schemeClr val="dk1"/>
           </a:lnRef>
           <a:fillRef idx="0">
-            <a:schemeClr val="accent1"/>
+            <a:schemeClr val="dk1"/>
           </a:fillRef>
-          <a:effectRef idx="0">
-            <a:schemeClr val="accent1"/>
+          <a:effectRef idx="2">
+            <a:schemeClr val="dk1"/>
           </a:effectRef>
           <a:fontRef idx="minor">
             <a:schemeClr val="tx1"/>
@@ -19053,7 +19112,7 @@
             </a:pPr>
             <a:r>
               <a:rPr lang="en-US" dirty="0"/>
-              <a:t>*Each of these stages are implicitly dependent upon instruction[31:0]. Other small pieces of logic (such as PC+4) have also not been listed.</a:t>
+              <a:t>*Each of these stages is implicitly dependent upon instruction[31:0]. Other small pieces of logic (such as PC+4) have also not been listed.</a:t>
             </a:r>
           </a:p>
           <a:p>

</xml_diff>